<commit_message>
Update Development Management Video Presentation.pptx
</commit_message>
<xml_diff>
--- a/Assessments/Management/Development Management Video Presentation.pptx
+++ b/Assessments/Management/Development Management Video Presentation.pptx
@@ -114,6 +114,11 @@
       </a:defRPr>
     </a:lvl9pPr>
   </p:defaultTextStyle>
+  <p:extLst>
+    <p:ext uri="{EFAFB233-063F-42B5-8137-9DF3F51BA10A}">
+      <p15:sldGuideLst xmlns:p15="http://schemas.microsoft.com/office/powerpoint/2012/main"/>
+    </p:ext>
+  </p:extLst>
 </p:presentation>
 </file>
 
@@ -199,7 +204,7 @@
           <a:p>
             <a:fld id="{D4B05B7C-42E2-400C-9789-CEB47A119C89}" type="datetimeFigureOut">
               <a:rPr lang="en-GB" smtClean="0"/>
-              <a:t>07/01/2019</a:t>
+              <a:t>08/01/2019</a:t>
             </a:fld>
             <a:endParaRPr lang="en-GB"/>
           </a:p>
@@ -1337,7 +1342,7 @@
           <a:p>
             <a:fld id="{1160EA64-D806-43AC-9DF2-F8C432F32B4C}" type="datetimeFigureOut">
               <a:rPr lang="en-US" dirty="0"/>
-              <a:t>1/7/2019</a:t>
+              <a:t>1/8/2019</a:t>
             </a:fld>
             <a:endParaRPr lang="en-US" dirty="0"/>
           </a:p>
@@ -1503,7 +1508,7 @@
           <a:p>
             <a:fld id="{E9F9C37B-1D36-470B-8223-D6C91242EC14}" type="datetimeFigureOut">
               <a:rPr lang="en-US" dirty="0"/>
-              <a:t>1/7/2019</a:t>
+              <a:t>1/8/2019</a:t>
             </a:fld>
             <a:endParaRPr lang="en-US" dirty="0"/>
           </a:p>
@@ -1678,7 +1683,7 @@
           <a:p>
             <a:fld id="{67C6F52A-A82B-47A2-A83A-8C4C91F2D59F}" type="datetimeFigureOut">
               <a:rPr lang="en-US" dirty="0"/>
-              <a:t>1/7/2019</a:t>
+              <a:t>1/8/2019</a:t>
             </a:fld>
             <a:endParaRPr lang="en-US" dirty="0"/>
           </a:p>
@@ -1843,7 +1848,7 @@
           <a:p>
             <a:fld id="{F070A7B3-6521-4DCA-87E5-044747A908C1}" type="datetimeFigureOut">
               <a:rPr lang="en-US" dirty="0"/>
-              <a:t>1/7/2019</a:t>
+              <a:t>1/8/2019</a:t>
             </a:fld>
             <a:endParaRPr lang="en-US" dirty="0"/>
           </a:p>
@@ -2107,7 +2112,7 @@
           <a:p>
             <a:fld id="{1160EA64-D806-43AC-9DF2-F8C432F32B4C}" type="datetimeFigureOut">
               <a:rPr lang="en-US" dirty="0"/>
-              <a:t>1/7/2019</a:t>
+              <a:t>1/8/2019</a:t>
             </a:fld>
             <a:endParaRPr lang="en-US" dirty="0"/>
           </a:p>
@@ -2335,7 +2340,7 @@
           <a:p>
             <a:fld id="{AB134690-1557-4C89-A502-4959FE7FAD70}" type="datetimeFigureOut">
               <a:rPr lang="en-US" dirty="0"/>
-              <a:t>1/7/2019</a:t>
+              <a:t>1/8/2019</a:t>
             </a:fld>
             <a:endParaRPr lang="en-US" dirty="0"/>
           </a:p>
@@ -2689,7 +2694,7 @@
           <a:p>
             <a:fld id="{4F7D4976-E339-4826-83B7-FBD03F55ECF8}" type="datetimeFigureOut">
               <a:rPr lang="en-US" dirty="0"/>
-              <a:t>1/7/2019</a:t>
+              <a:t>1/8/2019</a:t>
             </a:fld>
             <a:endParaRPr lang="en-US" dirty="0"/>
           </a:p>
@@ -2825,7 +2830,7 @@
           <a:p>
             <a:fld id="{E1037C31-9E7A-4F99-8774-A0E530DE1A42}" type="datetimeFigureOut">
               <a:rPr lang="en-US" dirty="0"/>
-              <a:t>1/7/2019</a:t>
+              <a:t>1/8/2019</a:t>
             </a:fld>
             <a:endParaRPr lang="en-US" dirty="0"/>
           </a:p>
@@ -2915,7 +2920,7 @@
           <a:p>
             <a:fld id="{C278504F-A551-4DE0-9316-4DCD1D8CC752}" type="datetimeFigureOut">
               <a:rPr lang="en-US" dirty="0"/>
-              <a:t>1/7/2019</a:t>
+              <a:t>1/8/2019</a:t>
             </a:fld>
             <a:endParaRPr lang="en-US" dirty="0"/>
           </a:p>
@@ -3267,7 +3272,7 @@
           <a:p>
             <a:fld id="{D1BE4249-C0D0-4B06-8692-E8BB871AF643}" type="datetimeFigureOut">
               <a:rPr lang="en-US" dirty="0"/>
-              <a:t>1/7/2019</a:t>
+              <a:t>1/8/2019</a:t>
             </a:fld>
             <a:endParaRPr lang="en-US" dirty="0"/>
           </a:p>
@@ -3619,7 +3624,7 @@
           <a:p>
             <a:fld id="{042B0DB6-F5C7-45FB-8CF3-31B45F9C2DAC}" type="datetimeFigureOut">
               <a:rPr lang="en-US" dirty="0"/>
-              <a:t>1/7/2019</a:t>
+              <a:t>1/8/2019</a:t>
             </a:fld>
             <a:endParaRPr lang="en-US" dirty="0"/>
           </a:p>
@@ -3855,7 +3860,7 @@
           <a:p>
             <a:fld id="{1160EA64-D806-43AC-9DF2-F8C432F32B4C}" type="datetimeFigureOut">
               <a:rPr lang="en-US" dirty="0"/>
-              <a:t>1/7/2019</a:t>
+              <a:t>1/8/2019</a:t>
             </a:fld>
             <a:endParaRPr lang="en-US" dirty="0"/>
           </a:p>
@@ -4393,7 +4398,7 @@
           <p:nvPr/>
         </p:nvPicPr>
         <p:blipFill>
-          <a:blip r:embed="rId4"/>
+          <a:blip r:embed="rId6"/>
           <a:stretch>
             <a:fillRect/>
           </a:stretch>
@@ -4423,7 +4428,7 @@
           <p:nvPr/>
         </p:nvPicPr>
         <p:blipFill>
-          <a:blip r:embed="rId5"/>
+          <a:blip r:embed="rId7"/>
           <a:stretch>
             <a:fillRect/>
           </a:stretch>
@@ -4432,6 +4437,44 @@
           <a:xfrm>
             <a:off x="6430716" y="2813742"/>
             <a:ext cx="5427881" cy="3689872"/>
+          </a:xfrm>
+          <a:prstGeom prst="rect">
+            <a:avLst/>
+          </a:prstGeom>
+        </p:spPr>
+      </p:pic>
+      <p:pic>
+        <p:nvPicPr>
+          <p:cNvPr id="6" name="bensound-perception">
+            <a:hlinkClick r:id="" action="ppaction://media"/>
+            <a:extLst>
+              <a:ext uri="{FF2B5EF4-FFF2-40B4-BE49-F238E27FC236}">
+                <a16:creationId xmlns:a16="http://schemas.microsoft.com/office/drawing/2014/main" id="{08C3FCC8-E8E8-481D-8BCA-9001BC9CFC5D}"/>
+              </a:ext>
+            </a:extLst>
+          </p:cNvPr>
+          <p:cNvPicPr>
+            <a:picLocks noChangeAspect="1"/>
+          </p:cNvPicPr>
+          <p:nvPr>
+            <a:audioFile r:link="rId3"/>
+            <p:extLst>
+              <p:ext uri="{DAA4B4D4-6D71-4841-9C94-3DE7FCFB9230}">
+                <p14:media xmlns:p14="http://schemas.microsoft.com/office/powerpoint/2010/main" r:embed="rId2"/>
+              </p:ext>
+            </p:extLst>
+          </p:nvPr>
+        </p:nvPicPr>
+        <p:blipFill>
+          <a:blip r:embed="rId8"/>
+          <a:stretch>
+            <a:fillRect/>
+          </a:stretch>
+        </p:blipFill>
+        <p:spPr>
+          <a:xfrm>
+            <a:off x="5439050" y="3118989"/>
+            <a:ext cx="609600" cy="609600"/>
           </a:xfrm>
           <a:prstGeom prst="rect">
             <a:avLst/>
@@ -4463,6 +4506,9 @@
                     <p:cTn id="3" fill="hold">
                       <p:stCondLst>
                         <p:cond delay="indefinite"/>
+                        <p:cond evt="onBegin" delay="0">
+                          <p:tn val="2"/>
+                        </p:cond>
                       </p:stCondLst>
                       <p:childTnLst>
                         <p:par>
@@ -4472,14 +4518,49 @@
                             </p:stCondLst>
                             <p:childTnLst>
                               <p:par>
-                                <p:cTn id="5" presetID="2" presetClass="entr" presetSubtype="4" fill="hold" nodeType="clickEffect">
+                                <p:cTn id="5" presetID="1" presetClass="mediacall" presetSubtype="0" fill="hold" nodeType="afterEffect">
+                                  <p:stCondLst>
+                                    <p:cond delay="0"/>
+                                  </p:stCondLst>
+                                  <p:childTnLst>
+                                    <p:cmd type="call" cmd="playFrom(0.0)">
+                                      <p:cBhvr>
+                                        <p:cTn id="6" dur="1" fill="hold"/>
+                                        <p:tgtEl>
+                                          <p:spTgt spid="6"/>
+                                        </p:tgtEl>
+                                      </p:cBhvr>
+                                    </p:cmd>
+                                  </p:childTnLst>
+                                </p:cTn>
+                              </p:par>
+                            </p:childTnLst>
+                          </p:cTn>
+                        </p:par>
+                      </p:childTnLst>
+                    </p:cTn>
+                  </p:par>
+                  <p:par>
+                    <p:cTn id="7" fill="hold">
+                      <p:stCondLst>
+                        <p:cond delay="indefinite"/>
+                      </p:stCondLst>
+                      <p:childTnLst>
+                        <p:par>
+                          <p:cTn id="8" fill="hold">
+                            <p:stCondLst>
+                              <p:cond delay="0"/>
+                            </p:stCondLst>
+                            <p:childTnLst>
+                              <p:par>
+                                <p:cTn id="9" presetID="2" presetClass="entr" presetSubtype="4" fill="hold" nodeType="clickEffect">
                                   <p:stCondLst>
                                     <p:cond delay="0"/>
                                   </p:stCondLst>
                                   <p:childTnLst>
                                     <p:set>
                                       <p:cBhvr>
-                                        <p:cTn id="6" dur="1" fill="hold">
+                                        <p:cTn id="10" dur="1" fill="hold">
                                           <p:stCondLst>
                                             <p:cond delay="0"/>
                                           </p:stCondLst>
@@ -4497,7 +4578,7 @@
                                     </p:set>
                                     <p:anim calcmode="lin" valueType="num">
                                       <p:cBhvr additive="base">
-                                        <p:cTn id="7" dur="500" fill="hold"/>
+                                        <p:cTn id="11" dur="500" fill="hold"/>
                                         <p:tgtEl>
                                           <p:spTgt spid="5"/>
                                         </p:tgtEl>
@@ -4520,7 +4601,7 @@
                                     </p:anim>
                                     <p:anim calcmode="lin" valueType="num">
                                       <p:cBhvr additive="base">
-                                        <p:cTn id="8" dur="500" fill="hold"/>
+                                        <p:cTn id="12" dur="500" fill="hold"/>
                                         <p:tgtEl>
                                           <p:spTgt spid="5"/>
                                         </p:tgtEl>
@@ -4551,26 +4632,26 @@
                     </p:cTn>
                   </p:par>
                   <p:par>
-                    <p:cTn id="9" fill="hold">
+                    <p:cTn id="13" fill="hold">
                       <p:stCondLst>
                         <p:cond delay="indefinite"/>
                       </p:stCondLst>
                       <p:childTnLst>
                         <p:par>
-                          <p:cTn id="10" fill="hold">
+                          <p:cTn id="14" fill="hold">
                             <p:stCondLst>
                               <p:cond delay="0"/>
                             </p:stCondLst>
                             <p:childTnLst>
                               <p:par>
-                                <p:cTn id="11" presetID="2" presetClass="entr" presetSubtype="4" fill="hold" nodeType="clickEffect">
+                                <p:cTn id="15" presetID="2" presetClass="entr" presetSubtype="4" fill="hold" nodeType="clickEffect">
                                   <p:stCondLst>
                                     <p:cond delay="0"/>
                                   </p:stCondLst>
                                   <p:childTnLst>
                                     <p:set>
                                       <p:cBhvr>
-                                        <p:cTn id="12" dur="1" fill="hold">
+                                        <p:cTn id="16" dur="1" fill="hold">
                                           <p:stCondLst>
                                             <p:cond delay="0"/>
                                           </p:stCondLst>
@@ -4588,7 +4669,7 @@
                                     </p:set>
                                     <p:anim calcmode="lin" valueType="num">
                                       <p:cBhvr additive="base">
-                                        <p:cTn id="13" dur="500" fill="hold"/>
+                                        <p:cTn id="17" dur="500" fill="hold"/>
                                         <p:tgtEl>
                                           <p:spTgt spid="7"/>
                                         </p:tgtEl>
@@ -4611,7 +4692,7 @@
                                     </p:anim>
                                     <p:anim calcmode="lin" valueType="num">
                                       <p:cBhvr additive="base">
-                                        <p:cTn id="14" dur="500" fill="hold"/>
+                                        <p:cTn id="18" dur="500" fill="hold"/>
                                         <p:tgtEl>
                                           <p:spTgt spid="7"/>
                                         </p:tgtEl>
@@ -4642,26 +4723,26 @@
                     </p:cTn>
                   </p:par>
                   <p:par>
-                    <p:cTn id="15" fill="hold">
+                    <p:cTn id="19" fill="hold">
                       <p:stCondLst>
                         <p:cond delay="indefinite"/>
                       </p:stCondLst>
                       <p:childTnLst>
                         <p:par>
-                          <p:cTn id="16" fill="hold">
+                          <p:cTn id="20" fill="hold">
                             <p:stCondLst>
                               <p:cond delay="0"/>
                             </p:stCondLst>
                             <p:childTnLst>
                               <p:par>
-                                <p:cTn id="17" presetID="2" presetClass="exit" presetSubtype="4" fill="hold" nodeType="clickEffect">
+                                <p:cTn id="21" presetID="2" presetClass="exit" presetSubtype="4" fill="hold" nodeType="clickEffect">
                                   <p:stCondLst>
                                     <p:cond delay="0"/>
                                   </p:stCondLst>
                                   <p:childTnLst>
                                     <p:anim calcmode="lin" valueType="num">
                                       <p:cBhvr additive="base">
-                                        <p:cTn id="18" dur="500"/>
+                                        <p:cTn id="22" dur="500"/>
                                         <p:tgtEl>
                                           <p:spTgt spid="5"/>
                                         </p:tgtEl>
@@ -4684,7 +4765,7 @@
                                     </p:anim>
                                     <p:anim calcmode="lin" valueType="num">
                                       <p:cBhvr additive="base">
-                                        <p:cTn id="19" dur="500"/>
+                                        <p:cTn id="23" dur="500"/>
                                         <p:tgtEl>
                                           <p:spTgt spid="5"/>
                                         </p:tgtEl>
@@ -4707,7 +4788,7 @@
                                     </p:anim>
                                     <p:set>
                                       <p:cBhvr>
-                                        <p:cTn id="20" dur="1" fill="hold">
+                                        <p:cTn id="24" dur="1" fill="hold">
                                           <p:stCondLst>
                                             <p:cond delay="499"/>
                                           </p:stCondLst>
@@ -4733,26 +4814,26 @@
                     </p:cTn>
                   </p:par>
                   <p:par>
-                    <p:cTn id="21" fill="hold">
+                    <p:cTn id="25" fill="hold">
                       <p:stCondLst>
                         <p:cond delay="indefinite"/>
                       </p:stCondLst>
                       <p:childTnLst>
                         <p:par>
-                          <p:cTn id="22" fill="hold">
+                          <p:cTn id="26" fill="hold">
                             <p:stCondLst>
                               <p:cond delay="0"/>
                             </p:stCondLst>
                             <p:childTnLst>
                               <p:par>
-                                <p:cTn id="23" presetID="2" presetClass="exit" presetSubtype="4" fill="hold" nodeType="clickEffect">
+                                <p:cTn id="27" presetID="2" presetClass="exit" presetSubtype="4" fill="hold" nodeType="clickEffect">
                                   <p:stCondLst>
                                     <p:cond delay="0"/>
                                   </p:stCondLst>
                                   <p:childTnLst>
                                     <p:anim calcmode="lin" valueType="num">
                                       <p:cBhvr additive="base">
-                                        <p:cTn id="24" dur="500"/>
+                                        <p:cTn id="28" dur="500"/>
                                         <p:tgtEl>
                                           <p:spTgt spid="7"/>
                                         </p:tgtEl>
@@ -4775,7 +4856,7 @@
                                     </p:anim>
                                     <p:anim calcmode="lin" valueType="num">
                                       <p:cBhvr additive="base">
-                                        <p:cTn id="25" dur="500"/>
+                                        <p:cTn id="29" dur="500"/>
                                         <p:tgtEl>
                                           <p:spTgt spid="7"/>
                                         </p:tgtEl>
@@ -4798,7 +4879,7 @@
                                     </p:anim>
                                     <p:set>
                                       <p:cBhvr>
-                                        <p:cTn id="26" dur="1" fill="hold">
+                                        <p:cTn id="30" dur="1" fill="hold">
                                           <p:stCondLst>
                                             <p:cond delay="499"/>
                                           </p:stCondLst>
@@ -4840,6 +4921,25 @@
                 </p:cond>
               </p:nextCondLst>
             </p:seq>
+            <p:audio>
+              <p:cMediaNode vol="4545" numSld="999" showWhenStopped="0">
+                <p:cTn id="31" repeatCount="indefinite" fill="hold" display="0">
+                  <p:stCondLst>
+                    <p:cond delay="indefinite"/>
+                  </p:stCondLst>
+                  <p:endCondLst>
+                    <p:cond evt="onStopAudio" delay="0">
+                      <p:tgtEl>
+                        <p:sldTgt/>
+                      </p:tgtEl>
+                    </p:cond>
+                  </p:endCondLst>
+                </p:cTn>
+                <p:tgtEl>
+                  <p:spTgt spid="6"/>
+                </p:tgtEl>
+              </p:cMediaNode>
+            </p:audio>
           </p:childTnLst>
         </p:cTn>
       </p:par>
@@ -5113,12 +5213,8 @@
           <a:lstStyle/>
           <a:p>
             <a:r>
-              <a:rPr lang="en-GB" dirty="0" err="1"/>
-              <a:t>eXtreme</a:t>
-            </a:r>
-            <a:r>
               <a:rPr lang="en-GB" dirty="0"/>
-              <a:t> Programming (XP)</a:t>
+              <a:t>eXtreme Programming (XP)</a:t>
             </a:r>
           </a:p>
         </p:txBody>

</xml_diff>